<commit_message>
new version of the course
</commit_message>
<xml_diff>
--- a/notebooks/1_Introduction.pptx
+++ b/notebooks/1_Introduction.pptx
@@ -219,7 +219,7 @@
           <a:p>
             <a:fld id="{6D0BFDE5-5B9C-1348-B3A7-621F47AF5A3A}" type="datetimeFigureOut">
               <a:rPr lang="en-US" smtClean="0"/>
-              <a:t>5/2/22</a:t>
+              <a:t>5/5/22</a:t>
             </a:fld>
             <a:endParaRPr lang="en-US"/>
           </a:p>
@@ -397,7 +397,7 @@
           <a:p>
             <a:fld id="{F438453F-F1B3-B848-B302-15F3A290B787}" type="datetimeFigureOut">
               <a:rPr lang="en-US" smtClean="0"/>
-              <a:t>5/2/22</a:t>
+              <a:t>5/5/22</a:t>
             </a:fld>
             <a:endParaRPr lang="en-US"/>
           </a:p>
@@ -984,11 +984,10 @@
           <a:bodyPr/>
           <a:lstStyle/>
           <a:p>
-            <a:fld id="{414FE1D6-1A39-D84A-B5AA-B6A778789908}" type="datetime3">
-              <a:rPr lang="en-US" smtClean="0"/>
-              <a:t>2 May 2022</a:t>
-            </a:fld>
-            <a:endParaRPr lang="en-US"/>
+            <a:r>
+              <a:rPr lang="en-US"/>
+              <a:t>11 May 2022</a:t>
+            </a:r>
           </a:p>
         </p:txBody>
       </p:sp>
@@ -1195,11 +1194,10 @@
           <a:bodyPr/>
           <a:lstStyle/>
           <a:p>
-            <a:fld id="{E0C218C5-3101-FD49-997D-52DC15F8AD61}" type="datetime3">
-              <a:rPr lang="en-US" smtClean="0"/>
-              <a:t>2 May 2022</a:t>
-            </a:fld>
-            <a:endParaRPr lang="en-US"/>
+            <a:r>
+              <a:rPr lang="en-US"/>
+              <a:t>11 May 2022</a:t>
+            </a:r>
           </a:p>
         </p:txBody>
       </p:sp>
@@ -1396,11 +1394,10 @@
           <a:bodyPr/>
           <a:lstStyle/>
           <a:p>
-            <a:fld id="{DB492B3D-F0D2-0E4F-89FA-8814ADAEEA11}" type="datetime3">
-              <a:rPr lang="en-US" smtClean="0"/>
-              <a:t>2 May 2022</a:t>
-            </a:fld>
-            <a:endParaRPr lang="en-US"/>
+            <a:r>
+              <a:rPr lang="en-US"/>
+              <a:t>11 May 2022</a:t>
+            </a:r>
           </a:p>
         </p:txBody>
       </p:sp>
@@ -1870,11 +1867,10 @@
           <a:bodyPr/>
           <a:lstStyle/>
           <a:p>
-            <a:fld id="{B1C7AAC1-0DAF-8B45-9213-C862628C9DBA}" type="datetime3">
-              <a:rPr lang="en-US" smtClean="0"/>
-              <a:t>2 May 2022</a:t>
-            </a:fld>
-            <a:endParaRPr lang="en-US"/>
+            <a:r>
+              <a:rPr lang="en-US"/>
+              <a:t>11 May 2022</a:t>
+            </a:r>
           </a:p>
         </p:txBody>
       </p:sp>
@@ -2285,11 +2281,10 @@
           <a:bodyPr/>
           <a:lstStyle/>
           <a:p>
-            <a:fld id="{CA91E045-07A4-2940-AECD-98C3AE5A77D1}" type="datetime3">
-              <a:rPr lang="en-US" smtClean="0"/>
-              <a:t>2 May 2022</a:t>
-            </a:fld>
-            <a:endParaRPr lang="en-US"/>
+            <a:r>
+              <a:rPr lang="en-US"/>
+              <a:t>11 May 2022</a:t>
+            </a:r>
           </a:p>
         </p:txBody>
       </p:sp>
@@ -2429,11 +2424,10 @@
           <a:bodyPr/>
           <a:lstStyle/>
           <a:p>
-            <a:fld id="{7F42CB57-A3ED-AB45-8906-BC235E667C59}" type="datetime3">
-              <a:rPr lang="en-US" smtClean="0"/>
-              <a:t>2 May 2022</a:t>
-            </a:fld>
-            <a:endParaRPr lang="en-US"/>
+            <a:r>
+              <a:rPr lang="en-US"/>
+              <a:t>11 May 2022</a:t>
+            </a:r>
           </a:p>
         </p:txBody>
       </p:sp>
@@ -2545,11 +2539,10 @@
           <a:bodyPr/>
           <a:lstStyle/>
           <a:p>
-            <a:fld id="{2E6972C4-A444-6D44-A047-39EE4DB9DF81}" type="datetime3">
-              <a:rPr lang="en-US" smtClean="0"/>
-              <a:t>2 May 2022</a:t>
-            </a:fld>
-            <a:endParaRPr lang="en-US"/>
+            <a:r>
+              <a:rPr lang="en-US"/>
+              <a:t>11 May 2022</a:t>
+            </a:r>
           </a:p>
         </p:txBody>
       </p:sp>
@@ -2859,11 +2852,10 @@
           <a:bodyPr/>
           <a:lstStyle/>
           <a:p>
-            <a:fld id="{3081B075-0849-6C49-B18E-0FAEE8A3E14A}" type="datetime3">
-              <a:rPr lang="en-US" smtClean="0"/>
-              <a:t>2 May 2022</a:t>
-            </a:fld>
-            <a:endParaRPr lang="en-US"/>
+            <a:r>
+              <a:rPr lang="en-US"/>
+              <a:t>11 May 2022</a:t>
+            </a:r>
           </a:p>
         </p:txBody>
       </p:sp>
@@ -3153,11 +3145,10 @@
           <a:bodyPr/>
           <a:lstStyle/>
           <a:p>
-            <a:fld id="{E13684E9-DD79-3142-B323-D44BF99C1541}" type="datetime3">
-              <a:rPr lang="en-US" smtClean="0"/>
-              <a:t>2 May 2022</a:t>
-            </a:fld>
-            <a:endParaRPr lang="en-US"/>
+            <a:r>
+              <a:rPr lang="en-US"/>
+              <a:t>11 May 2022</a:t>
+            </a:r>
           </a:p>
         </p:txBody>
       </p:sp>
@@ -3397,11 +3388,10 @@
             </a:lvl1pPr>
           </a:lstStyle>
           <a:p>
-            <a:fld id="{5A0764DF-F764-2B49-A4F0-AAA90498C27D}" type="datetime3">
-              <a:rPr lang="en-US" smtClean="0"/>
-              <a:t>2 May 2022</a:t>
-            </a:fld>
-            <a:endParaRPr lang="en-US"/>
+            <a:r>
+              <a:rPr lang="en-US"/>
+              <a:t>11 May 2022</a:t>
+            </a:r>
           </a:p>
         </p:txBody>
       </p:sp>
@@ -4132,11 +4122,10 @@
           <a:bodyPr/>
           <a:lstStyle/>
           <a:p>
-            <a:fld id="{D97EE4AC-2CD5-D34A-B08F-E4C25C51E580}" type="datetime3">
-              <a:rPr lang="en-US" smtClean="0"/>
-              <a:t>2 May 2022</a:t>
-            </a:fld>
-            <a:endParaRPr lang="en-US"/>
+            <a:r>
+              <a:rPr lang="en-US"/>
+              <a:t>11 May 2022</a:t>
+            </a:r>
           </a:p>
         </p:txBody>
       </p:sp>
@@ -4191,7 +4180,7 @@
           <a:lstStyle/>
           <a:p>
             <a:r>
-              <a:rPr lang="en-US"/>
+              <a:rPr lang="en-US" dirty="0"/>
               <a:t>https://github.com/samplics-org/aapor_short_course_may2022</a:t>
             </a:r>
           </a:p>
@@ -4497,11 +4486,10 @@
           <a:bodyPr/>
           <a:lstStyle/>
           <a:p>
-            <a:fld id="{51DB4571-61EE-DC49-8383-599747781900}" type="datetime3">
-              <a:rPr lang="en-US" smtClean="0"/>
-              <a:t>3 May 2022</a:t>
-            </a:fld>
-            <a:endParaRPr lang="en-US"/>
+            <a:r>
+              <a:rPr lang="en-US"/>
+              <a:t>11 May 2022</a:t>
+            </a:r>
           </a:p>
         </p:txBody>
       </p:sp>
@@ -4913,11 +4901,10 @@
           <a:bodyPr/>
           <a:lstStyle/>
           <a:p>
-            <a:fld id="{51DB4571-61EE-DC49-8383-599747781900}" type="datetime3">
-              <a:rPr lang="en-US" smtClean="0"/>
-              <a:t>3 May 2022</a:t>
-            </a:fld>
-            <a:endParaRPr lang="en-US"/>
+            <a:r>
+              <a:rPr lang="en-US"/>
+              <a:t>11 May 2022</a:t>
+            </a:r>
           </a:p>
         </p:txBody>
       </p:sp>
@@ -5097,11 +5084,10 @@
           <a:bodyPr/>
           <a:lstStyle/>
           <a:p>
-            <a:fld id="{51DB4571-61EE-DC49-8383-599747781900}" type="datetime3">
-              <a:rPr lang="en-US" smtClean="0"/>
-              <a:t>3 May 2022</a:t>
-            </a:fld>
-            <a:endParaRPr lang="en-US"/>
+            <a:r>
+              <a:rPr lang="en-US"/>
+              <a:t>11 May 2022</a:t>
+            </a:r>
           </a:p>
         </p:txBody>
       </p:sp>
@@ -5303,11 +5289,10 @@
           <a:bodyPr/>
           <a:lstStyle/>
           <a:p>
-            <a:fld id="{51DB4571-61EE-DC49-8383-599747781900}" type="datetime3">
-              <a:rPr lang="en-US" smtClean="0"/>
-              <a:t>3 May 2022</a:t>
-            </a:fld>
-            <a:endParaRPr lang="en-US"/>
+            <a:r>
+              <a:rPr lang="en-US"/>
+              <a:t>11 May 2022</a:t>
+            </a:r>
           </a:p>
         </p:txBody>
       </p:sp>
@@ -5742,11 +5727,10 @@
           <a:bodyPr/>
           <a:lstStyle/>
           <a:p>
-            <a:fld id="{51DB4571-61EE-DC49-8383-599747781900}" type="datetime3">
-              <a:rPr lang="en-US" smtClean="0"/>
-              <a:t>3 May 2022</a:t>
-            </a:fld>
-            <a:endParaRPr lang="en-US"/>
+            <a:r>
+              <a:rPr lang="en-US"/>
+              <a:t>11 May 2022</a:t>
+            </a:r>
           </a:p>
         </p:txBody>
       </p:sp>

</xml_diff>

<commit_message>
new version of samplics and a few edits
</commit_message>
<xml_diff>
--- a/notebooks/1_Introduction.pptx
+++ b/notebooks/1_Introduction.pptx
@@ -5,20 +5,21 @@
     <p:sldMasterId id="2147483660" r:id="rId1"/>
   </p:sldMasterIdLst>
   <p:notesMasterIdLst>
-    <p:notesMasterId r:id="rId10"/>
+    <p:notesMasterId r:id="rId11"/>
   </p:notesMasterIdLst>
   <p:handoutMasterIdLst>
-    <p:handoutMasterId r:id="rId11"/>
+    <p:handoutMasterId r:id="rId12"/>
   </p:handoutMasterIdLst>
   <p:sldIdLst>
     <p:sldId id="256" r:id="rId2"/>
-    <p:sldId id="264" r:id="rId3"/>
-    <p:sldId id="282" r:id="rId4"/>
-    <p:sldId id="285" r:id="rId5"/>
-    <p:sldId id="263" r:id="rId6"/>
-    <p:sldId id="286" r:id="rId7"/>
-    <p:sldId id="284" r:id="rId8"/>
-    <p:sldId id="283" r:id="rId9"/>
+    <p:sldId id="287" r:id="rId3"/>
+    <p:sldId id="264" r:id="rId4"/>
+    <p:sldId id="282" r:id="rId5"/>
+    <p:sldId id="285" r:id="rId6"/>
+    <p:sldId id="263" r:id="rId7"/>
+    <p:sldId id="286" r:id="rId8"/>
+    <p:sldId id="284" r:id="rId9"/>
+    <p:sldId id="283" r:id="rId10"/>
   </p:sldIdLst>
   <p:sldSz cx="12192000" cy="6858000"/>
   <p:notesSz cx="6858000" cy="9144000"/>
@@ -219,7 +220,7 @@
           <a:p>
             <a:fld id="{6D0BFDE5-5B9C-1348-B3A7-621F47AF5A3A}" type="datetimeFigureOut">
               <a:rPr lang="en-US" smtClean="0"/>
-              <a:t>5/5/22</a:t>
+              <a:t>5/7/22</a:t>
             </a:fld>
             <a:endParaRPr lang="en-US"/>
           </a:p>
@@ -397,7 +398,7 @@
           <a:p>
             <a:fld id="{F438453F-F1B3-B848-B302-15F3A290B787}" type="datetimeFigureOut">
               <a:rPr lang="en-US" smtClean="0"/>
-              <a:t>5/5/22</a:t>
+              <a:t>5/7/22</a:t>
             </a:fld>
             <a:endParaRPr lang="en-US"/>
           </a:p>
@@ -3964,7 +3965,7 @@
           <p:cNvPr id="2" name="Title 1">
             <a:extLst>
               <a:ext uri="{FF2B5EF4-FFF2-40B4-BE49-F238E27FC236}">
-                <a16:creationId xmlns:a16="http://schemas.microsoft.com/office/drawing/2014/main" id="{5E3CB9A6-5152-F0DC-73A5-849711284B30}"/>
+                <a16:creationId xmlns:a16="http://schemas.microsoft.com/office/drawing/2014/main" id="{E0FB2581-6CA7-8536-88D2-C7484398EB89}"/>
               </a:ext>
             </a:extLst>
           </p:cNvPr>
@@ -3982,7 +3983,7 @@
           <a:p>
             <a:r>
               <a:rPr lang="en-US" dirty="0"/>
-              <a:t>Plan of the tutorial</a:t>
+              <a:t>Who I am?</a:t>
             </a:r>
           </a:p>
         </p:txBody>
@@ -3992,7 +3993,7 @@
           <p:cNvPr id="3" name="Content Placeholder 2">
             <a:extLst>
               <a:ext uri="{FF2B5EF4-FFF2-40B4-BE49-F238E27FC236}">
-                <a16:creationId xmlns:a16="http://schemas.microsoft.com/office/drawing/2014/main" id="{C926FF33-CACA-9783-C56D-CD1545A66B65}"/>
+                <a16:creationId xmlns:a16="http://schemas.microsoft.com/office/drawing/2014/main" id="{F9D3FD75-B45E-4255-8657-FF519F183A48}"/>
               </a:ext>
             </a:extLst>
           </p:cNvPr>
@@ -4014,90 +4015,186 @@
               <a:buNone/>
             </a:pPr>
             <a:r>
-              <a:rPr lang="en-US" dirty="0"/>
-              <a:t>Introduction </a:t>
+              <a:rPr lang="en-US" sz="2400" b="1" dirty="0">
+                <a:latin typeface="Garamond" panose="02020404030301010803" pitchFamily="18" charset="0"/>
+              </a:rPr>
+              <a:t>Experience</a:t>
+            </a:r>
+            <a:r>
+              <a:rPr lang="en-US" sz="2400" dirty="0">
+                <a:latin typeface="Garamond" panose="02020404030301010803" pitchFamily="18" charset="0"/>
+              </a:rPr>
+              <a:t>. 15+ years in survey sampling and statistical analysis</a:t>
+            </a:r>
+          </a:p>
+          <a:p>
+            <a:pPr lvl="1"/>
+            <a:r>
+              <a:rPr lang="en-US" sz="2000" dirty="0">
+                <a:latin typeface="Garamond" panose="02020404030301010803" pitchFamily="18" charset="0"/>
+              </a:rPr>
+              <a:t>Current </a:t>
+            </a:r>
+          </a:p>
+          <a:p>
+            <a:pPr lvl="2"/>
+            <a:r>
+              <a:rPr lang="en-US" sz="1800" dirty="0">
+                <a:latin typeface="Garamond" panose="02020404030301010803" pitchFamily="18" charset="0"/>
+              </a:rPr>
+              <a:t>Creator and lead developer of </a:t>
+            </a:r>
+            <a:r>
+              <a:rPr lang="en-US" sz="1800" b="1" dirty="0">
+                <a:latin typeface="Garamond" panose="02020404030301010803" pitchFamily="18" charset="0"/>
+              </a:rPr>
+              <a:t>Samplics</a:t>
+            </a:r>
+          </a:p>
+          <a:p>
+            <a:pPr lvl="2"/>
+            <a:r>
+              <a:rPr lang="en-US" sz="1800" dirty="0">
+                <a:latin typeface="Garamond" panose="02020404030301010803" pitchFamily="18" charset="0"/>
+              </a:rPr>
+              <a:t>Chief Data Scientist and COO of </a:t>
+            </a:r>
+            <a:r>
+              <a:rPr lang="en-US" sz="1800" b="1" dirty="0">
+                <a:latin typeface="Garamond" panose="02020404030301010803" pitchFamily="18" charset="0"/>
+              </a:rPr>
+              <a:t>The Saudi Center for Opinion Polling (SCOP)</a:t>
+            </a:r>
+          </a:p>
+          <a:p>
+            <a:pPr lvl="1"/>
+            <a:r>
+              <a:rPr lang="en-US" sz="2000" dirty="0">
+                <a:latin typeface="Garamond" panose="02020404030301010803" pitchFamily="18" charset="0"/>
+              </a:rPr>
+              <a:t>Immunization Data Lead at </a:t>
+            </a:r>
+            <a:r>
+              <a:rPr lang="en-US" sz="2000" b="1" dirty="0">
+                <a:latin typeface="Garamond" panose="02020404030301010803" pitchFamily="18" charset="0"/>
+              </a:rPr>
+              <a:t>UNICEF</a:t>
+            </a:r>
+            <a:r>
+              <a:rPr lang="en-US" sz="2000" dirty="0">
+                <a:latin typeface="Garamond" panose="02020404030301010803" pitchFamily="18" charset="0"/>
+              </a:rPr>
+              <a:t> (2016 – 2021)</a:t>
+            </a:r>
+          </a:p>
+          <a:p>
+            <a:pPr lvl="1"/>
+            <a:r>
+              <a:rPr lang="en-US" sz="2000" dirty="0">
+                <a:latin typeface="Garamond" panose="02020404030301010803" pitchFamily="18" charset="0"/>
+              </a:rPr>
+              <a:t>Senior statistician at </a:t>
+            </a:r>
+            <a:r>
+              <a:rPr lang="en-US" sz="2000" b="1" dirty="0" err="1">
+                <a:latin typeface="Garamond" panose="02020404030301010803" pitchFamily="18" charset="0"/>
+              </a:rPr>
+              <a:t>Westat</a:t>
+            </a:r>
+            <a:r>
+              <a:rPr lang="en-US" sz="2000" dirty="0">
+                <a:latin typeface="Garamond" panose="02020404030301010803" pitchFamily="18" charset="0"/>
+              </a:rPr>
+              <a:t> (2011 – 2016)</a:t>
+            </a:r>
+          </a:p>
+          <a:p>
+            <a:pPr lvl="1"/>
+            <a:r>
+              <a:rPr lang="en-US" sz="2000" dirty="0">
+                <a:latin typeface="Garamond" panose="02020404030301010803" pitchFamily="18" charset="0"/>
+              </a:rPr>
+              <a:t>Mathematical Statistician at </a:t>
+            </a:r>
+            <a:r>
+              <a:rPr lang="en-US" sz="2000" b="1" dirty="0">
+                <a:latin typeface="Garamond" panose="02020404030301010803" pitchFamily="18" charset="0"/>
+              </a:rPr>
+              <a:t>Statistics Canada </a:t>
+            </a:r>
+            <a:r>
+              <a:rPr lang="en-US" sz="2000" dirty="0">
+                <a:latin typeface="Garamond" panose="02020404030301010803" pitchFamily="18" charset="0"/>
+              </a:rPr>
+              <a:t>(2006 – 2011)</a:t>
             </a:r>
           </a:p>
           <a:p>
             <a:pPr marL="0" indent="0">
               <a:buNone/>
             </a:pPr>
-            <a:endParaRPr lang="en-US" sz="800" dirty="0"/>
+            <a:endParaRPr lang="en-US" sz="800" dirty="0">
+              <a:latin typeface="Garamond" panose="02020404030301010803" pitchFamily="18" charset="0"/>
+            </a:endParaRPr>
           </a:p>
           <a:p>
             <a:pPr marL="0" indent="0">
               <a:buNone/>
             </a:pPr>
             <a:r>
-              <a:rPr lang="en-US" dirty="0"/>
-              <a:t>Part I: Introduction to Python</a:t>
+              <a:rPr lang="en-US" sz="2400" b="1" dirty="0">
+                <a:latin typeface="Garamond" panose="02020404030301010803" pitchFamily="18" charset="0"/>
+              </a:rPr>
+              <a:t>Education</a:t>
+            </a:r>
+            <a:r>
+              <a:rPr lang="en-US" sz="2400" dirty="0">
+                <a:latin typeface="Garamond" panose="02020404030301010803" pitchFamily="18" charset="0"/>
+              </a:rPr>
+              <a:t>. </a:t>
             </a:r>
           </a:p>
           <a:p>
             <a:pPr lvl="1"/>
             <a:r>
-              <a:rPr lang="en-US" dirty="0"/>
-              <a:t>Basic Python</a:t>
-            </a:r>
-          </a:p>
-          <a:p>
-            <a:pPr lvl="1"/>
-            <a:r>
-              <a:rPr lang="en-US" dirty="0"/>
-              <a:t>Pandas: the Python </a:t>
-            </a:r>
-            <a:r>
-              <a:rPr lang="en-US" dirty="0" err="1"/>
-              <a:t>DataFrame</a:t>
-            </a:r>
-            <a:endParaRPr lang="en-US" dirty="0"/>
-          </a:p>
-          <a:p>
-            <a:pPr lvl="1"/>
-            <a:endParaRPr lang="en-US" sz="800" dirty="0"/>
+              <a:rPr lang="en-US" sz="2000" dirty="0">
+                <a:latin typeface="Garamond" panose="02020404030301010803" pitchFamily="18" charset="0"/>
+              </a:rPr>
+              <a:t>PhD in Small Area Estimation at Carleton University, Ottawa, Canada, 2015</a:t>
+            </a:r>
+          </a:p>
+          <a:p>
+            <a:pPr marL="457200" lvl="1" indent="0">
+              <a:buNone/>
+            </a:pPr>
+            <a:r>
+              <a:rPr lang="en-US" sz="2000" dirty="0">
+                <a:latin typeface="Garamond" panose="02020404030301010803" pitchFamily="18" charset="0"/>
+              </a:rPr>
+              <a:t>    </a:t>
+            </a:r>
+            <a:r>
+              <a:rPr lang="en-US" sz="2400" dirty="0">
+                <a:latin typeface="Garamond" panose="02020404030301010803" pitchFamily="18" charset="0"/>
+              </a:rPr>
+              <a:t>(under the direction of Prof. J.N.K Rao)</a:t>
+            </a:r>
           </a:p>
           <a:p>
             <a:pPr marL="0" indent="0">
               <a:buNone/>
             </a:pPr>
-            <a:r>
-              <a:rPr lang="en-US" dirty="0"/>
-              <a:t>Part II: Sampling using Python</a:t>
-            </a:r>
-          </a:p>
-          <a:p>
-            <a:pPr lvl="1"/>
-            <a:r>
-              <a:rPr lang="en-US" dirty="0"/>
-              <a:t>Overview of Survey Sampling</a:t>
-            </a:r>
-          </a:p>
-          <a:p>
-            <a:pPr lvl="1"/>
-            <a:r>
-              <a:rPr lang="en-US" dirty="0"/>
-              <a:t>Introduction to Samplics</a:t>
-            </a:r>
-          </a:p>
-          <a:p>
-            <a:pPr lvl="2"/>
-            <a:r>
-              <a:rPr lang="en-US" dirty="0"/>
-              <a:t>Sample size calculation </a:t>
-            </a:r>
-          </a:p>
-          <a:p>
-            <a:pPr lvl="2"/>
-            <a:r>
-              <a:rPr lang="en-US" dirty="0"/>
-              <a:t>Sample selection </a:t>
-            </a:r>
-          </a:p>
-          <a:p>
-            <a:pPr marL="457200" lvl="1" indent="0">
+            <a:endParaRPr lang="en-US" sz="2400" dirty="0">
+              <a:latin typeface="Garamond" panose="02020404030301010803" pitchFamily="18" charset="0"/>
+            </a:endParaRPr>
+          </a:p>
+          <a:p>
+            <a:pPr marL="0" indent="0">
               <a:buNone/>
             </a:pPr>
-            <a:endParaRPr lang="en-US" dirty="0"/>
+            <a:endParaRPr lang="en-US" sz="2400" dirty="0">
+              <a:latin typeface="Garamond" panose="02020404030301010803" pitchFamily="18" charset="0"/>
+            </a:endParaRPr>
           </a:p>
         </p:txBody>
       </p:sp>
@@ -4106,7 +4203,7 @@
           <p:cNvPr id="4" name="Date Placeholder 3">
             <a:extLst>
               <a:ext uri="{FF2B5EF4-FFF2-40B4-BE49-F238E27FC236}">
-                <a16:creationId xmlns:a16="http://schemas.microsoft.com/office/drawing/2014/main" id="{9126F22E-F967-5172-88BE-008D67DCFA2C}"/>
+                <a16:creationId xmlns:a16="http://schemas.microsoft.com/office/drawing/2014/main" id="{7D5DF65D-89B0-50F1-4149-9A4342C1FEC5}"/>
               </a:ext>
             </a:extLst>
           </p:cNvPr>
@@ -4131,10 +4228,38 @@
       </p:sp>
       <p:sp>
         <p:nvSpPr>
-          <p:cNvPr id="5" name="Slide Number Placeholder 4">
-            <a:extLst>
-              <a:ext uri="{FF2B5EF4-FFF2-40B4-BE49-F238E27FC236}">
-                <a16:creationId xmlns:a16="http://schemas.microsoft.com/office/drawing/2014/main" id="{E93B8646-CA34-DEA0-BA36-CB7E1E7D0F45}"/>
+          <p:cNvPr id="5" name="Footer Placeholder 4">
+            <a:extLst>
+              <a:ext uri="{FF2B5EF4-FFF2-40B4-BE49-F238E27FC236}">
+                <a16:creationId xmlns:a16="http://schemas.microsoft.com/office/drawing/2014/main" id="{31190F0B-B49B-4A93-556B-BFC6F8EF76B4}"/>
+              </a:ext>
+            </a:extLst>
+          </p:cNvPr>
+          <p:cNvSpPr>
+            <a:spLocks noGrp="1"/>
+          </p:cNvSpPr>
+          <p:nvPr>
+            <p:ph type="ftr" sz="quarter" idx="11"/>
+          </p:nvPr>
+        </p:nvSpPr>
+        <p:spPr/>
+        <p:txBody>
+          <a:bodyPr/>
+          <a:lstStyle/>
+          <a:p>
+            <a:r>
+              <a:rPr lang="en-US"/>
+              <a:t>https://github.com/samplics-org/aapor_short_course_may2022</a:t>
+            </a:r>
+          </a:p>
+        </p:txBody>
+      </p:sp>
+      <p:sp>
+        <p:nvSpPr>
+          <p:cNvPr id="6" name="Slide Number Placeholder 5">
+            <a:extLst>
+              <a:ext uri="{FF2B5EF4-FFF2-40B4-BE49-F238E27FC236}">
+                <a16:creationId xmlns:a16="http://schemas.microsoft.com/office/drawing/2014/main" id="{DDDAB5CC-9AC7-D261-5000-5E507E0E8539}"/>
               </a:ext>
             </a:extLst>
           </p:cNvPr>
@@ -4158,38 +4283,220 @@
           </a:p>
         </p:txBody>
       </p:sp>
-      <p:sp>
-        <p:nvSpPr>
-          <p:cNvPr id="7" name="Footer Placeholder 6">
-            <a:extLst>
-              <a:ext uri="{FF2B5EF4-FFF2-40B4-BE49-F238E27FC236}">
-                <a16:creationId xmlns:a16="http://schemas.microsoft.com/office/drawing/2014/main" id="{1C1F3918-78F5-6178-5CE5-5AD9A60553A9}"/>
-              </a:ext>
-            </a:extLst>
-          </p:cNvPr>
-          <p:cNvSpPr>
-            <a:spLocks noGrp="1"/>
-          </p:cNvSpPr>
-          <p:nvPr>
-            <p:ph type="ftr" sz="quarter" idx="11"/>
-          </p:nvPr>
-        </p:nvSpPr>
-        <p:spPr/>
-        <p:txBody>
-          <a:bodyPr/>
-          <a:lstStyle/>
-          <a:p>
-            <a:r>
-              <a:rPr lang="en-US" dirty="0"/>
-              <a:t>https://github.com/samplics-org/aapor_short_course_may2022</a:t>
-            </a:r>
-          </a:p>
-        </p:txBody>
-      </p:sp>
+      <p:pic>
+        <p:nvPicPr>
+          <p:cNvPr id="10" name="Picture 9" descr="Icon&#10;&#10;Description automatically generated">
+            <a:extLst>
+              <a:ext uri="{FF2B5EF4-FFF2-40B4-BE49-F238E27FC236}">
+                <a16:creationId xmlns:a16="http://schemas.microsoft.com/office/drawing/2014/main" id="{56B9C499-0D6C-BCEE-AAE3-0133A14BE629}"/>
+              </a:ext>
+            </a:extLst>
+          </p:cNvPr>
+          <p:cNvPicPr>
+            <a:picLocks noChangeAspect="1"/>
+          </p:cNvPicPr>
+          <p:nvPr/>
+        </p:nvPicPr>
+        <p:blipFill>
+          <a:blip r:embed="rId2"/>
+          <a:stretch>
+            <a:fillRect/>
+          </a:stretch>
+        </p:blipFill>
+        <p:spPr>
+          <a:xfrm>
+            <a:off x="9739021" y="2427620"/>
+            <a:ext cx="615565" cy="636791"/>
+          </a:xfrm>
+          <a:prstGeom prst="rect">
+            <a:avLst/>
+          </a:prstGeom>
+        </p:spPr>
+      </p:pic>
+      <p:pic>
+        <p:nvPicPr>
+          <p:cNvPr id="12" name="Picture 11" descr="A picture containing text, clipart&#10;&#10;Description automatically generated">
+            <a:extLst>
+              <a:ext uri="{FF2B5EF4-FFF2-40B4-BE49-F238E27FC236}">
+                <a16:creationId xmlns:a16="http://schemas.microsoft.com/office/drawing/2014/main" id="{6EE925A5-1857-87E4-CE2E-5EB5204180E6}"/>
+              </a:ext>
+            </a:extLst>
+          </p:cNvPr>
+          <p:cNvPicPr>
+            <a:picLocks noChangeAspect="1"/>
+          </p:cNvPicPr>
+          <p:nvPr/>
+        </p:nvPicPr>
+        <p:blipFill>
+          <a:blip r:embed="rId3"/>
+          <a:stretch>
+            <a:fillRect/>
+          </a:stretch>
+        </p:blipFill>
+        <p:spPr>
+          <a:xfrm>
+            <a:off x="9566595" y="3666405"/>
+            <a:ext cx="960419" cy="367219"/>
+          </a:xfrm>
+          <a:prstGeom prst="rect">
+            <a:avLst/>
+          </a:prstGeom>
+        </p:spPr>
+      </p:pic>
+      <p:pic>
+        <p:nvPicPr>
+          <p:cNvPr id="14" name="Picture 13" descr="Text&#10;&#10;Description automatically generated">
+            <a:extLst>
+              <a:ext uri="{FF2B5EF4-FFF2-40B4-BE49-F238E27FC236}">
+                <a16:creationId xmlns:a16="http://schemas.microsoft.com/office/drawing/2014/main" id="{0D3839E8-13F9-D28A-7306-283C2CFDB773}"/>
+              </a:ext>
+            </a:extLst>
+          </p:cNvPr>
+          <p:cNvPicPr>
+            <a:picLocks noChangeAspect="1"/>
+          </p:cNvPicPr>
+          <p:nvPr/>
+        </p:nvPicPr>
+        <p:blipFill>
+          <a:blip r:embed="rId4"/>
+          <a:stretch>
+            <a:fillRect/>
+          </a:stretch>
+        </p:blipFill>
+        <p:spPr>
+          <a:xfrm>
+            <a:off x="8956709" y="4184940"/>
+            <a:ext cx="2113289" cy="370124"/>
+          </a:xfrm>
+          <a:prstGeom prst="rect">
+            <a:avLst/>
+          </a:prstGeom>
+        </p:spPr>
+      </p:pic>
+      <p:pic>
+        <p:nvPicPr>
+          <p:cNvPr id="16" name="Picture 15" descr="Text&#10;&#10;Description automatically generated with medium confidence">
+            <a:extLst>
+              <a:ext uri="{FF2B5EF4-FFF2-40B4-BE49-F238E27FC236}">
+                <a16:creationId xmlns:a16="http://schemas.microsoft.com/office/drawing/2014/main" id="{6C8BD7D7-367E-B111-10A0-72B891928656}"/>
+              </a:ext>
+            </a:extLst>
+          </p:cNvPr>
+          <p:cNvPicPr>
+            <a:picLocks noChangeAspect="1"/>
+          </p:cNvPicPr>
+          <p:nvPr/>
+        </p:nvPicPr>
+        <p:blipFill>
+          <a:blip r:embed="rId5"/>
+          <a:stretch>
+            <a:fillRect/>
+          </a:stretch>
+        </p:blipFill>
+        <p:spPr>
+          <a:xfrm>
+            <a:off x="8827820" y="3165036"/>
+            <a:ext cx="2371069" cy="400744"/>
+          </a:xfrm>
+          <a:prstGeom prst="rect">
+            <a:avLst/>
+          </a:prstGeom>
+        </p:spPr>
+      </p:pic>
+      <p:pic>
+        <p:nvPicPr>
+          <p:cNvPr id="18" name="Picture 17" descr="Logo, company name&#10;&#10;Description automatically generated">
+            <a:extLst>
+              <a:ext uri="{FF2B5EF4-FFF2-40B4-BE49-F238E27FC236}">
+                <a16:creationId xmlns:a16="http://schemas.microsoft.com/office/drawing/2014/main" id="{B242A46D-D61D-3D70-686D-4350EB3C2AC0}"/>
+              </a:ext>
+            </a:extLst>
+          </p:cNvPr>
+          <p:cNvPicPr>
+            <a:picLocks noChangeAspect="1"/>
+          </p:cNvPicPr>
+          <p:nvPr/>
+        </p:nvPicPr>
+        <p:blipFill>
+          <a:blip r:embed="rId6"/>
+          <a:stretch>
+            <a:fillRect/>
+          </a:stretch>
+        </p:blipFill>
+        <p:spPr>
+          <a:xfrm>
+            <a:off x="9566593" y="1806510"/>
+            <a:ext cx="960419" cy="520485"/>
+          </a:xfrm>
+          <a:prstGeom prst="rect">
+            <a:avLst/>
+          </a:prstGeom>
+        </p:spPr>
+      </p:pic>
+      <p:pic>
+        <p:nvPicPr>
+          <p:cNvPr id="24" name="Picture 23" descr="Text&#10;&#10;Description automatically generated with medium confidence">
+            <a:extLst>
+              <a:ext uri="{FF2B5EF4-FFF2-40B4-BE49-F238E27FC236}">
+                <a16:creationId xmlns:a16="http://schemas.microsoft.com/office/drawing/2014/main" id="{B5325443-872D-006C-D14E-0BBCAEE412AB}"/>
+              </a:ext>
+            </a:extLst>
+          </p:cNvPr>
+          <p:cNvPicPr>
+            <a:picLocks noChangeAspect="1"/>
+          </p:cNvPicPr>
+          <p:nvPr/>
+        </p:nvPicPr>
+        <p:blipFill>
+          <a:blip r:embed="rId7"/>
+          <a:stretch>
+            <a:fillRect/>
+          </a:stretch>
+        </p:blipFill>
+        <p:spPr>
+          <a:xfrm>
+            <a:off x="2083077" y="5610318"/>
+            <a:ext cx="2186774" cy="660892"/>
+          </a:xfrm>
+          <a:prstGeom prst="rect">
+            <a:avLst/>
+          </a:prstGeom>
+        </p:spPr>
+      </p:pic>
+      <p:pic>
+        <p:nvPicPr>
+          <p:cNvPr id="26" name="Picture 25">
+            <a:extLst>
+              <a:ext uri="{FF2B5EF4-FFF2-40B4-BE49-F238E27FC236}">
+                <a16:creationId xmlns:a16="http://schemas.microsoft.com/office/drawing/2014/main" id="{CC100880-A738-2E6D-7DCD-B42CDFC77AFD}"/>
+              </a:ext>
+            </a:extLst>
+          </p:cNvPr>
+          <p:cNvPicPr>
+            <a:picLocks noChangeAspect="1"/>
+          </p:cNvPicPr>
+          <p:nvPr/>
+        </p:nvPicPr>
+        <p:blipFill>
+          <a:blip r:embed="rId8"/>
+          <a:stretch>
+            <a:fillRect/>
+          </a:stretch>
+        </p:blipFill>
+        <p:spPr>
+          <a:xfrm>
+            <a:off x="4269851" y="5694363"/>
+            <a:ext cx="4965700" cy="482600"/>
+          </a:xfrm>
+          <a:prstGeom prst="rect">
+            <a:avLst/>
+          </a:prstGeom>
+        </p:spPr>
+      </p:pic>
     </p:spTree>
     <p:extLst>
       <p:ext uri="{BB962C8B-B14F-4D97-AF65-F5344CB8AC3E}">
-        <p14:creationId xmlns:p14="http://schemas.microsoft.com/office/powerpoint/2010/main" val="1729254023"/>
+        <p14:creationId xmlns:p14="http://schemas.microsoft.com/office/powerpoint/2010/main" val="1418770405"/>
       </p:ext>
     </p:extLst>
   </p:cSld>
@@ -4221,7 +4528,7 @@
           <p:cNvPr id="2" name="Title 1">
             <a:extLst>
               <a:ext uri="{FF2B5EF4-FFF2-40B4-BE49-F238E27FC236}">
-                <a16:creationId xmlns:a16="http://schemas.microsoft.com/office/drawing/2014/main" id="{CC35F8CD-F792-26AD-4D5B-B6010438C4AA}"/>
+                <a16:creationId xmlns:a16="http://schemas.microsoft.com/office/drawing/2014/main" id="{5E3CB9A6-5152-F0DC-73A5-849711284B30}"/>
               </a:ext>
             </a:extLst>
           </p:cNvPr>
@@ -4239,250 +4546,143 @@
           <a:p>
             <a:r>
               <a:rPr lang="en-US" dirty="0"/>
-              <a:t>Software for Survey Sampling</a:t>
-            </a:r>
-            <a:br>
+              <a:t>Plan of the tutorial</a:t>
+            </a:r>
+          </a:p>
+        </p:txBody>
+      </p:sp>
+      <p:sp>
+        <p:nvSpPr>
+          <p:cNvPr id="3" name="Content Placeholder 2">
+            <a:extLst>
+              <a:ext uri="{FF2B5EF4-FFF2-40B4-BE49-F238E27FC236}">
+                <a16:creationId xmlns:a16="http://schemas.microsoft.com/office/drawing/2014/main" id="{C926FF33-CACA-9783-C56D-CD1545A66B65}"/>
+              </a:ext>
+            </a:extLst>
+          </p:cNvPr>
+          <p:cNvSpPr>
+            <a:spLocks noGrp="1"/>
+          </p:cNvSpPr>
+          <p:nvPr>
+            <p:ph idx="1"/>
+          </p:nvPr>
+        </p:nvSpPr>
+        <p:spPr/>
+        <p:txBody>
+          <a:bodyPr>
+            <a:normAutofit/>
+          </a:bodyPr>
+          <a:lstStyle/>
+          <a:p>
+            <a:pPr marL="0" indent="0">
+              <a:buNone/>
+            </a:pPr>
+            <a:r>
               <a:rPr lang="en-US" dirty="0"/>
-            </a:br>
-            <a:r>
-              <a:rPr lang="en-US" sz="3200" dirty="0">
-                <a:solidFill>
-                  <a:schemeClr val="accent4"/>
-                </a:solidFill>
-              </a:rPr>
-              <a:t>From closed to open-source solutions</a:t>
-            </a:r>
-          </a:p>
-        </p:txBody>
-      </p:sp>
-      <p:sp>
-        <p:nvSpPr>
-          <p:cNvPr id="3" name="Content Placeholder 2">
-            <a:extLst>
-              <a:ext uri="{FF2B5EF4-FFF2-40B4-BE49-F238E27FC236}">
-                <a16:creationId xmlns:a16="http://schemas.microsoft.com/office/drawing/2014/main" id="{DDF0BCD3-9CA8-7B43-1F25-B45CA47DB457}"/>
-              </a:ext>
-            </a:extLst>
-          </p:cNvPr>
-          <p:cNvSpPr>
-            <a:spLocks noGrp="1"/>
-          </p:cNvSpPr>
-          <p:nvPr>
-            <p:ph idx="1"/>
+              <a:t>Introduction </a:t>
+            </a:r>
+          </a:p>
+          <a:p>
+            <a:pPr marL="0" indent="0">
+              <a:buNone/>
+            </a:pPr>
+            <a:endParaRPr lang="en-US" sz="800" dirty="0"/>
+          </a:p>
+          <a:p>
+            <a:pPr marL="0" indent="0">
+              <a:buNone/>
+            </a:pPr>
+            <a:r>
+              <a:rPr lang="en-US" dirty="0"/>
+              <a:t>Part I: Introduction to Python</a:t>
+            </a:r>
+          </a:p>
+          <a:p>
+            <a:pPr lvl="1"/>
+            <a:r>
+              <a:rPr lang="en-US" dirty="0"/>
+              <a:t>Basic Python</a:t>
+            </a:r>
+          </a:p>
+          <a:p>
+            <a:pPr lvl="1"/>
+            <a:r>
+              <a:rPr lang="en-US" dirty="0"/>
+              <a:t>Pandas: the Python </a:t>
+            </a:r>
+            <a:r>
+              <a:rPr lang="en-US" dirty="0" err="1"/>
+              <a:t>DataFrame</a:t>
+            </a:r>
+            <a:endParaRPr lang="en-US" dirty="0"/>
+          </a:p>
+          <a:p>
+            <a:pPr lvl="1"/>
+            <a:endParaRPr lang="en-US" sz="800" dirty="0"/>
+          </a:p>
+          <a:p>
+            <a:pPr marL="0" indent="0">
+              <a:buNone/>
+            </a:pPr>
+            <a:r>
+              <a:rPr lang="en-US" dirty="0"/>
+              <a:t>Part II: Sampling using Python</a:t>
+            </a:r>
+          </a:p>
+          <a:p>
+            <a:pPr lvl="1"/>
+            <a:r>
+              <a:rPr lang="en-US" dirty="0"/>
+              <a:t>Overview of Survey Sampling</a:t>
+            </a:r>
+          </a:p>
+          <a:p>
+            <a:pPr lvl="1"/>
+            <a:r>
+              <a:rPr lang="en-US" dirty="0"/>
+              <a:t>Introduction to Samplics</a:t>
+            </a:r>
+          </a:p>
+          <a:p>
+            <a:pPr lvl="2"/>
+            <a:r>
+              <a:rPr lang="en-US" dirty="0"/>
+              <a:t>Sample size calculation </a:t>
+            </a:r>
+          </a:p>
+          <a:p>
+            <a:pPr lvl="2"/>
+            <a:r>
+              <a:rPr lang="en-US" dirty="0"/>
+              <a:t>Sample selection </a:t>
+            </a:r>
+          </a:p>
+          <a:p>
+            <a:pPr marL="457200" lvl="1" indent="0">
+              <a:buNone/>
+            </a:pPr>
+            <a:endParaRPr lang="en-US" dirty="0"/>
+          </a:p>
+        </p:txBody>
+      </p:sp>
+      <p:sp>
+        <p:nvSpPr>
+          <p:cNvPr id="4" name="Date Placeholder 3">
+            <a:extLst>
+              <a:ext uri="{FF2B5EF4-FFF2-40B4-BE49-F238E27FC236}">
+                <a16:creationId xmlns:a16="http://schemas.microsoft.com/office/drawing/2014/main" id="{9126F22E-F967-5172-88BE-008D67DCFA2C}"/>
+              </a:ext>
+            </a:extLst>
+          </p:cNvPr>
+          <p:cNvSpPr>
+            <a:spLocks noGrp="1"/>
+          </p:cNvSpPr>
+          <p:nvPr>
+            <p:ph type="dt" sz="half" idx="10"/>
           </p:nvPr>
         </p:nvSpPr>
         <p:spPr/>
         <p:txBody>
-          <a:bodyPr>
-            <a:normAutofit lnSpcReduction="10000"/>
-          </a:bodyPr>
-          <a:lstStyle/>
-          <a:p>
-            <a:pPr marL="0" indent="0">
-              <a:buNone/>
-            </a:pPr>
-            <a:r>
-              <a:rPr lang="en-US" sz="2000" dirty="0"/>
-              <a:t>Closed or paid solutions*</a:t>
-            </a:r>
-          </a:p>
-          <a:p>
-            <a:pPr lvl="1"/>
-            <a:r>
-              <a:rPr lang="en-US" sz="1800" dirty="0"/>
-              <a:t>SAS (</a:t>
-            </a:r>
-            <a:r>
-              <a:rPr lang="en-US" sz="1800" dirty="0">
-                <a:hlinkClick r:id="rId2"/>
-              </a:rPr>
-              <a:t>https://www.sas.com/en_us/software/stat.html</a:t>
-            </a:r>
-            <a:r>
-              <a:rPr lang="en-US" sz="1800" dirty="0"/>
-              <a:t>) </a:t>
-            </a:r>
-          </a:p>
-          <a:p>
-            <a:pPr lvl="1"/>
-            <a:r>
-              <a:rPr lang="en-US" sz="1800" dirty="0"/>
-              <a:t>SPSS (</a:t>
-            </a:r>
-            <a:r>
-              <a:rPr lang="en-US" sz="1800" dirty="0">
-                <a:hlinkClick r:id="rId3"/>
-              </a:rPr>
-              <a:t>https://www.ibm.com/products/spss-statistics</a:t>
-            </a:r>
-            <a:r>
-              <a:rPr lang="en-US" sz="1800" dirty="0"/>
-              <a:t>)</a:t>
-            </a:r>
-          </a:p>
-          <a:p>
-            <a:pPr lvl="1"/>
-            <a:r>
-              <a:rPr lang="en-US" sz="1800" dirty="0"/>
-              <a:t>Stata (</a:t>
-            </a:r>
-            <a:r>
-              <a:rPr lang="en-US" sz="1800" dirty="0">
-                <a:hlinkClick r:id="rId4"/>
-              </a:rPr>
-              <a:t>https://www.stata.com/</a:t>
-            </a:r>
-            <a:r>
-              <a:rPr lang="en-US" sz="1800" dirty="0"/>
-              <a:t>)</a:t>
-            </a:r>
-          </a:p>
-          <a:p>
-            <a:pPr lvl="1"/>
-            <a:r>
-              <a:rPr lang="en-US" sz="1800" dirty="0"/>
-              <a:t>SUDAAN</a:t>
-            </a:r>
-            <a:r>
-              <a:rPr lang="en-US" sz="1600" dirty="0"/>
-              <a:t> </a:t>
-            </a:r>
-            <a:r>
-              <a:rPr lang="en-US" sz="1800" dirty="0"/>
-              <a:t>(</a:t>
-            </a:r>
-            <a:r>
-              <a:rPr lang="en-US" sz="1800" dirty="0">
-                <a:hlinkClick r:id="rId5"/>
-              </a:rPr>
-              <a:t>https://www.rti.org/impact/sudaan-statistical-software-analyzing-correlated-data</a:t>
-            </a:r>
-            <a:r>
-              <a:rPr lang="en-US" sz="1800" dirty="0"/>
-              <a:t>)</a:t>
-            </a:r>
-          </a:p>
-          <a:p>
-            <a:pPr lvl="1"/>
-            <a:r>
-              <a:rPr lang="en-US" sz="1800" dirty="0" err="1"/>
-              <a:t>WesVAR</a:t>
-            </a:r>
-            <a:r>
-              <a:rPr lang="en-US" sz="1800" dirty="0"/>
-              <a:t> (</a:t>
-            </a:r>
-            <a:r>
-              <a:rPr lang="en-US" sz="1800" dirty="0">
-                <a:hlinkClick r:id="rId6"/>
-              </a:rPr>
-              <a:t>https://www.westat.com/capability/information-technology/wesvar</a:t>
-            </a:r>
-            <a:r>
-              <a:rPr lang="en-US" sz="1800" dirty="0"/>
-              <a:t>)</a:t>
-            </a:r>
-          </a:p>
-          <a:p>
-            <a:pPr marL="0" indent="0">
-              <a:buNone/>
-            </a:pPr>
-            <a:r>
-              <a:rPr lang="en-US" sz="2000" dirty="0"/>
-              <a:t>Open-source solutions*</a:t>
-            </a:r>
-          </a:p>
-          <a:p>
-            <a:pPr lvl="1"/>
-            <a:r>
-              <a:rPr lang="en-US" sz="1800" dirty="0"/>
-              <a:t>R survey (</a:t>
-            </a:r>
-            <a:r>
-              <a:rPr lang="en-US" sz="1800" dirty="0">
-                <a:hlinkClick r:id="rId7"/>
-              </a:rPr>
-              <a:t>https://r-survey.r-forge.r-project.org/survey/</a:t>
-            </a:r>
-            <a:r>
-              <a:rPr lang="en-US" sz="1800" dirty="0"/>
-              <a:t>)</a:t>
-            </a:r>
-          </a:p>
-          <a:p>
-            <a:pPr lvl="1"/>
-            <a:r>
-              <a:rPr lang="en-US" sz="1800" dirty="0"/>
-              <a:t>EPI info (</a:t>
-            </a:r>
-            <a:r>
-              <a:rPr lang="en-US" sz="1800" dirty="0">
-                <a:hlinkClick r:id="rId8"/>
-              </a:rPr>
-              <a:t>https://www.cdc.gov/epiinfo/index.html</a:t>
-            </a:r>
-            <a:r>
-              <a:rPr lang="en-US" sz="1800" dirty="0"/>
-              <a:t>)</a:t>
-            </a:r>
-          </a:p>
-          <a:p>
-            <a:pPr lvl="1"/>
-            <a:endParaRPr lang="en-US" sz="1800" dirty="0"/>
-          </a:p>
-          <a:p>
-            <a:pPr marL="0" indent="0">
-              <a:buNone/>
-            </a:pPr>
-            <a:r>
-              <a:rPr lang="en-US" sz="2000" dirty="0"/>
-              <a:t>No Python based solution until now with samplics</a:t>
-            </a:r>
-          </a:p>
-          <a:p>
-            <a:pPr marL="0" indent="0">
-              <a:buNone/>
-            </a:pPr>
-            <a:r>
-              <a:rPr lang="en-US" sz="2000" dirty="0">
-                <a:hlinkClick r:id="rId9"/>
-              </a:rPr>
-              <a:t>https://samplics.readthedocs.io/en/latest/</a:t>
-            </a:r>
-            <a:r>
-              <a:rPr lang="en-US" sz="2000" dirty="0"/>
-              <a:t> </a:t>
-            </a:r>
-          </a:p>
-          <a:p>
-            <a:pPr marL="0" indent="0" algn="r">
-              <a:buNone/>
-            </a:pPr>
-            <a:r>
-              <a:rPr lang="en-US" sz="2000" dirty="0"/>
-              <a:t>*List may not be exhaustive</a:t>
-            </a:r>
-          </a:p>
-        </p:txBody>
-      </p:sp>
-      <p:sp>
-        <p:nvSpPr>
-          <p:cNvPr id="4" name="Date Placeholder 3">
-            <a:extLst>
-              <a:ext uri="{FF2B5EF4-FFF2-40B4-BE49-F238E27FC236}">
-                <a16:creationId xmlns:a16="http://schemas.microsoft.com/office/drawing/2014/main" id="{FB2C5A03-4D2C-030B-9342-151C06739301}"/>
-              </a:ext>
-            </a:extLst>
-          </p:cNvPr>
-          <p:cNvSpPr>
-            <a:spLocks noGrp="1"/>
-          </p:cNvSpPr>
-          <p:nvPr>
-            <p:ph type="dt" sz="half" idx="10"/>
-          </p:nvPr>
-        </p:nvSpPr>
-        <p:spPr/>
-        <p:txBody>
           <a:bodyPr/>
           <a:lstStyle/>
           <a:p>
@@ -4498,7 +4698,7 @@
           <p:cNvPr id="5" name="Slide Number Placeholder 4">
             <a:extLst>
               <a:ext uri="{FF2B5EF4-FFF2-40B4-BE49-F238E27FC236}">
-                <a16:creationId xmlns:a16="http://schemas.microsoft.com/office/drawing/2014/main" id="{A3C7133C-D7A2-707F-3724-100F03474131}"/>
+                <a16:creationId xmlns:a16="http://schemas.microsoft.com/office/drawing/2014/main" id="{E93B8646-CA34-DEA0-BA36-CB7E1E7D0F45}"/>
               </a:ext>
             </a:extLst>
           </p:cNvPr>
@@ -4527,7 +4727,7 @@
           <p:cNvPr id="7" name="Footer Placeholder 6">
             <a:extLst>
               <a:ext uri="{FF2B5EF4-FFF2-40B4-BE49-F238E27FC236}">
-                <a16:creationId xmlns:a16="http://schemas.microsoft.com/office/drawing/2014/main" id="{CCDC45CE-8D34-3E3B-30CC-3F7A71ADC2E4}"/>
+                <a16:creationId xmlns:a16="http://schemas.microsoft.com/office/drawing/2014/main" id="{1C1F3918-78F5-6178-5CE5-5AD9A60553A9}"/>
               </a:ext>
             </a:extLst>
           </p:cNvPr>
@@ -4544,7 +4744,7 @@
           <a:lstStyle/>
           <a:p>
             <a:r>
-              <a:rPr lang="en-US"/>
+              <a:rPr lang="en-US" dirty="0"/>
               <a:t>https://github.com/samplics-org/aapor_short_course_may2022</a:t>
             </a:r>
           </a:p>
@@ -4553,7 +4753,7 @@
     </p:spTree>
     <p:extLst>
       <p:ext uri="{BB962C8B-B14F-4D97-AF65-F5344CB8AC3E}">
-        <p14:creationId xmlns:p14="http://schemas.microsoft.com/office/powerpoint/2010/main" val="352168527"/>
+        <p14:creationId xmlns:p14="http://schemas.microsoft.com/office/powerpoint/2010/main" val="1729254023"/>
       </p:ext>
     </p:extLst>
   </p:cSld>
@@ -4603,7 +4803,7 @@
           <a:p>
             <a:r>
               <a:rPr lang="en-US" dirty="0"/>
-              <a:t>Samplics: A Python Library for Sampling</a:t>
+              <a:t>Software for Survey Sampling</a:t>
             </a:r>
             <a:br>
               <a:rPr lang="en-US" dirty="0"/>
@@ -4614,7 +4814,7 @@
                   <a:schemeClr val="accent4"/>
                 </a:solidFill>
               </a:rPr>
-              <a:t>Comprehensive solution but still under development</a:t>
+              <a:t>From closed to open-source solutions</a:t>
             </a:r>
           </a:p>
         </p:txBody>
@@ -4637,245 +4837,194 @@
         </p:nvSpPr>
         <p:spPr/>
         <p:txBody>
-          <a:bodyPr numCol="2">
-            <a:normAutofit fontScale="92500" lnSpcReduction="10000"/>
+          <a:bodyPr>
+            <a:normAutofit lnSpcReduction="10000"/>
           </a:bodyPr>
           <a:lstStyle/>
           <a:p>
             <a:pPr marL="0" indent="0">
-              <a:lnSpc>
-                <a:spcPct val="120000"/>
-              </a:lnSpc>
               <a:buNone/>
             </a:pPr>
             <a:r>
               <a:rPr lang="en-US" sz="2000" dirty="0"/>
-              <a:t>Sample Size Calculation </a:t>
-            </a:r>
-          </a:p>
-          <a:p>
-            <a:pPr lvl="1">
-              <a:lnSpc>
-                <a:spcPct val="120000"/>
-              </a:lnSpc>
+              <a:t>Closed or paid solutions*</a:t>
+            </a:r>
+          </a:p>
+          <a:p>
+            <a:pPr lvl="1"/>
+            <a:r>
+              <a:rPr lang="en-US" sz="1800" dirty="0"/>
+              <a:t>SAS (</a:t>
+            </a:r>
+            <a:r>
+              <a:rPr lang="en-US" sz="1800" dirty="0">
+                <a:hlinkClick r:id="rId2"/>
+              </a:rPr>
+              <a:t>https://www.sas.com/en_us/software/stat.html</a:t>
+            </a:r>
+            <a:r>
+              <a:rPr lang="en-US" sz="1800" dirty="0"/>
+              <a:t>) </a:t>
+            </a:r>
+          </a:p>
+          <a:p>
+            <a:pPr lvl="1"/>
+            <a:r>
+              <a:rPr lang="en-US" sz="1800" dirty="0"/>
+              <a:t>SPSS (</a:t>
+            </a:r>
+            <a:r>
+              <a:rPr lang="en-US" sz="1800" dirty="0">
+                <a:hlinkClick r:id="rId3"/>
+              </a:rPr>
+              <a:t>https://www.ibm.com/products/spss-statistics</a:t>
+            </a:r>
+            <a:r>
+              <a:rPr lang="en-US" sz="1800" dirty="0"/>
+              <a:t>)</a:t>
+            </a:r>
+          </a:p>
+          <a:p>
+            <a:pPr lvl="1"/>
+            <a:r>
+              <a:rPr lang="en-US" sz="1800" dirty="0"/>
+              <a:t>Stata (</a:t>
+            </a:r>
+            <a:r>
+              <a:rPr lang="en-US" sz="1800" dirty="0">
+                <a:hlinkClick r:id="rId4"/>
+              </a:rPr>
+              <a:t>https://www.stata.com/</a:t>
+            </a:r>
+            <a:r>
+              <a:rPr lang="en-US" sz="1800" dirty="0"/>
+              <a:t>)</a:t>
+            </a:r>
+          </a:p>
+          <a:p>
+            <a:pPr lvl="1"/>
+            <a:r>
+              <a:rPr lang="en-US" sz="1800" dirty="0"/>
+              <a:t>SUDAAN</a:t>
+            </a:r>
+            <a:r>
+              <a:rPr lang="en-US" sz="1600" dirty="0"/>
+              <a:t> </a:t>
+            </a:r>
+            <a:r>
+              <a:rPr lang="en-US" sz="1800" dirty="0"/>
+              <a:t>(</a:t>
+            </a:r>
+            <a:r>
+              <a:rPr lang="en-US" sz="1800" dirty="0">
+                <a:hlinkClick r:id="rId5"/>
+              </a:rPr>
+              <a:t>https://www.rti.org/impact/sudaan-statistical-software-analyzing-correlated-data</a:t>
+            </a:r>
+            <a:r>
+              <a:rPr lang="en-US" sz="1800" dirty="0"/>
+              <a:t>)</a:t>
+            </a:r>
+          </a:p>
+          <a:p>
+            <a:pPr lvl="1"/>
+            <a:r>
+              <a:rPr lang="en-US" sz="1800" dirty="0" err="1"/>
+              <a:t>WesVAR</a:t>
+            </a:r>
+            <a:r>
+              <a:rPr lang="en-US" sz="1800" dirty="0"/>
+              <a:t> (</a:t>
+            </a:r>
+            <a:r>
+              <a:rPr lang="en-US" sz="1800" dirty="0">
+                <a:hlinkClick r:id="rId6"/>
+              </a:rPr>
+              <a:t>https://www.westat.com/capability/information-technology/wesvar</a:t>
+            </a:r>
+            <a:r>
+              <a:rPr lang="en-US" sz="1800" dirty="0"/>
+              <a:t>)</a:t>
+            </a:r>
+          </a:p>
+          <a:p>
+            <a:pPr marL="0" indent="0">
+              <a:buNone/>
             </a:pPr>
             <a:r>
+              <a:rPr lang="en-US" sz="2000" dirty="0"/>
+              <a:t>Open-source solutions*</a:t>
+            </a:r>
+          </a:p>
+          <a:p>
+            <a:pPr lvl="1"/>
+            <a:r>
               <a:rPr lang="en-US" sz="1800" dirty="0"/>
-              <a:t>Estimation of proportions, means, and total</a:t>
-            </a:r>
-          </a:p>
-          <a:p>
-            <a:pPr lvl="1">
-              <a:lnSpc>
-                <a:spcPct val="120000"/>
-              </a:lnSpc>
+              <a:t>R survey (</a:t>
+            </a:r>
+            <a:r>
+              <a:rPr lang="en-US" sz="1800" dirty="0">
+                <a:hlinkClick r:id="rId7"/>
+              </a:rPr>
+              <a:t>https://r-survey.r-forge.r-project.org/survey/</a:t>
+            </a:r>
+            <a:r>
+              <a:rPr lang="en-US" sz="1800" dirty="0"/>
+              <a:t>)</a:t>
+            </a:r>
+          </a:p>
+          <a:p>
+            <a:pPr lvl="1"/>
+            <a:r>
+              <a:rPr lang="en-US" sz="1800" dirty="0"/>
+              <a:t>EPI info (</a:t>
+            </a:r>
+            <a:r>
+              <a:rPr lang="en-US" sz="1800" dirty="0">
+                <a:hlinkClick r:id="rId8"/>
+              </a:rPr>
+              <a:t>https://www.cdc.gov/epiinfo/index.html</a:t>
+            </a:r>
+            <a:r>
+              <a:rPr lang="en-US" sz="1800" dirty="0"/>
+              <a:t>)</a:t>
+            </a:r>
+          </a:p>
+          <a:p>
+            <a:pPr lvl="1"/>
+            <a:endParaRPr lang="en-US" sz="1800" dirty="0"/>
+          </a:p>
+          <a:p>
+            <a:pPr marL="0" indent="0">
+              <a:buNone/>
             </a:pPr>
             <a:r>
-              <a:rPr lang="en-US" sz="1800" dirty="0"/>
-              <a:t>Comparisons of proportion, means, and total</a:t>
+              <a:rPr lang="en-US" sz="2000" dirty="0"/>
+              <a:t>No Python based solution until now with samplics</a:t>
             </a:r>
           </a:p>
           <a:p>
             <a:pPr marL="0" indent="0">
-              <a:lnSpc>
-                <a:spcPct val="120000"/>
-              </a:lnSpc>
               <a:buNone/>
             </a:pPr>
             <a:r>
+              <a:rPr lang="en-US" sz="2000" dirty="0">
+                <a:hlinkClick r:id="rId9"/>
+              </a:rPr>
+              <a:t>https://samplics.readthedocs.io/en/latest/</a:t>
+            </a:r>
+            <a:r>
               <a:rPr lang="en-US" sz="2000" dirty="0"/>
-              <a:t>Sample Selection </a:t>
-            </a:r>
-          </a:p>
-          <a:p>
-            <a:pPr lvl="1">
-              <a:lnSpc>
-                <a:spcPct val="120000"/>
-              </a:lnSpc>
+              <a:t> </a:t>
+            </a:r>
+          </a:p>
+          <a:p>
+            <a:pPr marL="0" indent="0" algn="r">
+              <a:buNone/>
             </a:pPr>
             <a:r>
-              <a:rPr lang="en-US" sz="1800" dirty="0"/>
-              <a:t>Simple Random Selection (SRS)</a:t>
-            </a:r>
-          </a:p>
-          <a:p>
-            <a:pPr lvl="1">
-              <a:lnSpc>
-                <a:spcPct val="120000"/>
-              </a:lnSpc>
-            </a:pPr>
-            <a:r>
-              <a:rPr lang="en-US" sz="1800" dirty="0"/>
-              <a:t>Systematic</a:t>
-            </a:r>
-          </a:p>
-          <a:p>
-            <a:pPr lvl="1">
-              <a:lnSpc>
-                <a:spcPct val="120000"/>
-              </a:lnSpc>
-            </a:pPr>
-            <a:r>
-              <a:rPr lang="en-US" sz="1800" dirty="0"/>
-              <a:t>Probability Proportional to Size (PPS)</a:t>
-            </a:r>
-          </a:p>
-          <a:p>
-            <a:pPr marL="0" indent="0">
-              <a:lnSpc>
-                <a:spcPct val="120000"/>
-              </a:lnSpc>
-              <a:buNone/>
-            </a:pPr>
-            <a:r>
               <a:rPr lang="en-US" sz="2000" dirty="0"/>
-              <a:t>Sample Weight adjustment</a:t>
-            </a:r>
-          </a:p>
-          <a:p>
-            <a:pPr lvl="1">
-              <a:lnSpc>
-                <a:spcPct val="120000"/>
-              </a:lnSpc>
-            </a:pPr>
-            <a:r>
-              <a:rPr lang="en-US" sz="1800" dirty="0"/>
-              <a:t>Non-response</a:t>
-            </a:r>
-          </a:p>
-          <a:p>
-            <a:pPr lvl="1">
-              <a:lnSpc>
-                <a:spcPct val="120000"/>
-              </a:lnSpc>
-            </a:pPr>
-            <a:r>
-              <a:rPr lang="en-US" sz="1800" dirty="0"/>
-              <a:t>Post-stratification and Calibration</a:t>
-            </a:r>
-          </a:p>
-          <a:p>
-            <a:pPr lvl="1">
-              <a:lnSpc>
-                <a:spcPct val="120000"/>
-              </a:lnSpc>
-            </a:pPr>
-            <a:r>
-              <a:rPr lang="en-US" sz="1800" dirty="0"/>
-              <a:t>Replicate weights</a:t>
-            </a:r>
-          </a:p>
-          <a:p>
-            <a:pPr marL="0" indent="0">
-              <a:lnSpc>
-                <a:spcPct val="120000"/>
-              </a:lnSpc>
-              <a:buNone/>
-            </a:pPr>
-            <a:r>
-              <a:rPr lang="en-US" sz="2000" dirty="0"/>
-              <a:t>Parameter estimation </a:t>
-            </a:r>
-          </a:p>
-          <a:p>
-            <a:pPr lvl="1">
-              <a:lnSpc>
-                <a:spcPct val="120000"/>
-              </a:lnSpc>
-            </a:pPr>
-            <a:r>
-              <a:rPr lang="en-US" sz="1800" dirty="0"/>
-              <a:t>Taylor-based methods</a:t>
-            </a:r>
-          </a:p>
-          <a:p>
-            <a:pPr lvl="1">
-              <a:lnSpc>
-                <a:spcPct val="120000"/>
-              </a:lnSpc>
-            </a:pPr>
-            <a:r>
-              <a:rPr lang="en-US" sz="1800" dirty="0"/>
-              <a:t>Replicate-based methods</a:t>
-            </a:r>
-          </a:p>
-          <a:p>
-            <a:pPr marL="0" indent="0">
-              <a:lnSpc>
-                <a:spcPct val="120000"/>
-              </a:lnSpc>
-              <a:buNone/>
-            </a:pPr>
-            <a:r>
-              <a:rPr lang="en-US" sz="2000" dirty="0"/>
-              <a:t>Regression </a:t>
-            </a:r>
-          </a:p>
-          <a:p>
-            <a:pPr marL="0" indent="0">
-              <a:lnSpc>
-                <a:spcPct val="120000"/>
-              </a:lnSpc>
-              <a:buNone/>
-            </a:pPr>
-            <a:r>
-              <a:rPr lang="en-US" sz="2000" dirty="0"/>
-              <a:t>Categorical Data Analysis </a:t>
-            </a:r>
-          </a:p>
-          <a:p>
-            <a:pPr lvl="1">
-              <a:lnSpc>
-                <a:spcPct val="120000"/>
-              </a:lnSpc>
-            </a:pPr>
-            <a:r>
-              <a:rPr lang="en-US" sz="1800" dirty="0"/>
-              <a:t>Tabulation </a:t>
-            </a:r>
-          </a:p>
-          <a:p>
-            <a:pPr lvl="1">
-              <a:lnSpc>
-                <a:spcPct val="120000"/>
-              </a:lnSpc>
-            </a:pPr>
-            <a:r>
-              <a:rPr lang="en-US" sz="1800" dirty="0"/>
-              <a:t>T-test</a:t>
-            </a:r>
-          </a:p>
-          <a:p>
-            <a:pPr>
-              <a:lnSpc>
-                <a:spcPct val="120000"/>
-              </a:lnSpc>
-            </a:pPr>
-            <a:r>
-              <a:rPr lang="en-US" sz="2000" dirty="0"/>
-              <a:t>Small Area Estimation</a:t>
-            </a:r>
-          </a:p>
-          <a:p>
-            <a:pPr lvl="1">
-              <a:lnSpc>
-                <a:spcPct val="120000"/>
-              </a:lnSpc>
-            </a:pPr>
-            <a:r>
-              <a:rPr lang="en-US" sz="1800" dirty="0"/>
-              <a:t>Area-level models </a:t>
-            </a:r>
-          </a:p>
-          <a:p>
-            <a:pPr lvl="1">
-              <a:lnSpc>
-                <a:spcPct val="120000"/>
-              </a:lnSpc>
-            </a:pPr>
-            <a:r>
-              <a:rPr lang="en-US" sz="1800" dirty="0"/>
-              <a:t>Unit-level models</a:t>
+              <a:t>*List may not be exhaustive</a:t>
             </a:r>
           </a:p>
         </p:txBody>
@@ -4968,7 +5117,7 @@
     </p:spTree>
     <p:extLst>
       <p:ext uri="{BB962C8B-B14F-4D97-AF65-F5344CB8AC3E}">
-        <p14:creationId xmlns:p14="http://schemas.microsoft.com/office/powerpoint/2010/main" val="1900575590"/>
+        <p14:creationId xmlns:p14="http://schemas.microsoft.com/office/powerpoint/2010/main" val="352168527"/>
       </p:ext>
     </p:extLst>
   </p:cSld>
@@ -5018,7 +5167,7 @@
           <a:p>
             <a:r>
               <a:rPr lang="en-US" dirty="0"/>
-              <a:t>Why develop a Python solution?</a:t>
+              <a:t>Samplics: A Python Library for Sampling</a:t>
             </a:r>
             <a:br>
               <a:rPr lang="en-US" dirty="0"/>
@@ -5029,40 +5178,272 @@
                   <a:schemeClr val="accent4"/>
                 </a:solidFill>
               </a:rPr>
-              <a:t>Python: one of the most used tool for data science/analysis</a:t>
-            </a:r>
-          </a:p>
-        </p:txBody>
-      </p:sp>
-      <p:pic>
-        <p:nvPicPr>
-          <p:cNvPr id="8" name="Content Placeholder 7" descr="Diagram&#10;&#10;Description automatically generated">
-            <a:extLst>
-              <a:ext uri="{FF2B5EF4-FFF2-40B4-BE49-F238E27FC236}">
-                <a16:creationId xmlns:a16="http://schemas.microsoft.com/office/drawing/2014/main" id="{2C66D708-3FE9-FD61-491E-258B3C7BD361}"/>
-              </a:ext>
-            </a:extLst>
-          </p:cNvPr>
-          <p:cNvPicPr>
-            <a:picLocks noGrp="1" noChangeAspect="1"/>
-          </p:cNvPicPr>
+              <a:t>Comprehensive solution but still under development</a:t>
+            </a:r>
+          </a:p>
+        </p:txBody>
+      </p:sp>
+      <p:sp>
+        <p:nvSpPr>
+          <p:cNvPr id="3" name="Content Placeholder 2">
+            <a:extLst>
+              <a:ext uri="{FF2B5EF4-FFF2-40B4-BE49-F238E27FC236}">
+                <a16:creationId xmlns:a16="http://schemas.microsoft.com/office/drawing/2014/main" id="{DDF0BCD3-9CA8-7B43-1F25-B45CA47DB457}"/>
+              </a:ext>
+            </a:extLst>
+          </p:cNvPr>
+          <p:cNvSpPr>
+            <a:spLocks noGrp="1"/>
+          </p:cNvSpPr>
           <p:nvPr>
             <p:ph idx="1"/>
           </p:nvPr>
-        </p:nvPicPr>
-        <p:blipFill>
-          <a:blip r:embed="rId2"/>
-          <a:stretch>
-            <a:fillRect/>
-          </a:stretch>
-        </p:blipFill>
-        <p:spPr>
-          <a:xfrm>
-            <a:off x="2489734" y="1818208"/>
-            <a:ext cx="6580694" cy="3798415"/>
-          </a:xfrm>
-        </p:spPr>
-      </p:pic>
+        </p:nvSpPr>
+        <p:spPr/>
+        <p:txBody>
+          <a:bodyPr numCol="2">
+            <a:normAutofit fontScale="92500" lnSpcReduction="10000"/>
+          </a:bodyPr>
+          <a:lstStyle/>
+          <a:p>
+            <a:pPr marL="0" indent="0">
+              <a:lnSpc>
+                <a:spcPct val="120000"/>
+              </a:lnSpc>
+              <a:buNone/>
+            </a:pPr>
+            <a:r>
+              <a:rPr lang="en-US" sz="2000" dirty="0"/>
+              <a:t>Sample Size Calculation </a:t>
+            </a:r>
+          </a:p>
+          <a:p>
+            <a:pPr lvl="1">
+              <a:lnSpc>
+                <a:spcPct val="120000"/>
+              </a:lnSpc>
+            </a:pPr>
+            <a:r>
+              <a:rPr lang="en-US" sz="1800" dirty="0"/>
+              <a:t>Estimation of proportions, means, and total</a:t>
+            </a:r>
+          </a:p>
+          <a:p>
+            <a:pPr lvl="1">
+              <a:lnSpc>
+                <a:spcPct val="120000"/>
+              </a:lnSpc>
+            </a:pPr>
+            <a:r>
+              <a:rPr lang="en-US" sz="1800" dirty="0"/>
+              <a:t>Comparisons of proportion, means, and total</a:t>
+            </a:r>
+          </a:p>
+          <a:p>
+            <a:pPr marL="0" indent="0">
+              <a:lnSpc>
+                <a:spcPct val="120000"/>
+              </a:lnSpc>
+              <a:buNone/>
+            </a:pPr>
+            <a:r>
+              <a:rPr lang="en-US" sz="2000" dirty="0"/>
+              <a:t>Sample Selection </a:t>
+            </a:r>
+          </a:p>
+          <a:p>
+            <a:pPr lvl="1">
+              <a:lnSpc>
+                <a:spcPct val="120000"/>
+              </a:lnSpc>
+            </a:pPr>
+            <a:r>
+              <a:rPr lang="en-US" sz="1800" dirty="0"/>
+              <a:t>Simple Random Selection (SRS)</a:t>
+            </a:r>
+          </a:p>
+          <a:p>
+            <a:pPr lvl="1">
+              <a:lnSpc>
+                <a:spcPct val="120000"/>
+              </a:lnSpc>
+            </a:pPr>
+            <a:r>
+              <a:rPr lang="en-US" sz="1800" dirty="0"/>
+              <a:t>Systematic</a:t>
+            </a:r>
+          </a:p>
+          <a:p>
+            <a:pPr lvl="1">
+              <a:lnSpc>
+                <a:spcPct val="120000"/>
+              </a:lnSpc>
+            </a:pPr>
+            <a:r>
+              <a:rPr lang="en-US" sz="1800" dirty="0"/>
+              <a:t>Probability Proportional to Size (PPS)</a:t>
+            </a:r>
+          </a:p>
+          <a:p>
+            <a:pPr marL="0" indent="0">
+              <a:lnSpc>
+                <a:spcPct val="120000"/>
+              </a:lnSpc>
+              <a:buNone/>
+            </a:pPr>
+            <a:r>
+              <a:rPr lang="en-US" sz="2000" dirty="0"/>
+              <a:t>Sample Weight adjustment</a:t>
+            </a:r>
+          </a:p>
+          <a:p>
+            <a:pPr lvl="1">
+              <a:lnSpc>
+                <a:spcPct val="120000"/>
+              </a:lnSpc>
+            </a:pPr>
+            <a:r>
+              <a:rPr lang="en-US" sz="1800" dirty="0"/>
+              <a:t>Non-response</a:t>
+            </a:r>
+          </a:p>
+          <a:p>
+            <a:pPr lvl="1">
+              <a:lnSpc>
+                <a:spcPct val="120000"/>
+              </a:lnSpc>
+            </a:pPr>
+            <a:r>
+              <a:rPr lang="en-US" sz="1800" dirty="0"/>
+              <a:t>Post-stratification and Calibration</a:t>
+            </a:r>
+          </a:p>
+          <a:p>
+            <a:pPr lvl="1">
+              <a:lnSpc>
+                <a:spcPct val="120000"/>
+              </a:lnSpc>
+            </a:pPr>
+            <a:r>
+              <a:rPr lang="en-US" sz="1800" dirty="0"/>
+              <a:t>Replicate weights</a:t>
+            </a:r>
+          </a:p>
+          <a:p>
+            <a:pPr marL="0" indent="0">
+              <a:lnSpc>
+                <a:spcPct val="120000"/>
+              </a:lnSpc>
+              <a:buNone/>
+            </a:pPr>
+            <a:r>
+              <a:rPr lang="en-US" sz="2000" dirty="0"/>
+              <a:t>Parameter estimation </a:t>
+            </a:r>
+          </a:p>
+          <a:p>
+            <a:pPr lvl="1">
+              <a:lnSpc>
+                <a:spcPct val="120000"/>
+              </a:lnSpc>
+            </a:pPr>
+            <a:r>
+              <a:rPr lang="en-US" sz="1800" dirty="0"/>
+              <a:t>Taylor-based methods</a:t>
+            </a:r>
+          </a:p>
+          <a:p>
+            <a:pPr lvl="1">
+              <a:lnSpc>
+                <a:spcPct val="120000"/>
+              </a:lnSpc>
+            </a:pPr>
+            <a:r>
+              <a:rPr lang="en-US" sz="1800" dirty="0"/>
+              <a:t>Replicate-based methods</a:t>
+            </a:r>
+          </a:p>
+          <a:p>
+            <a:pPr marL="0" indent="0">
+              <a:lnSpc>
+                <a:spcPct val="120000"/>
+              </a:lnSpc>
+              <a:buNone/>
+            </a:pPr>
+            <a:r>
+              <a:rPr lang="en-US" sz="2000" dirty="0"/>
+              <a:t>Regression </a:t>
+            </a:r>
+          </a:p>
+          <a:p>
+            <a:pPr marL="0" indent="0">
+              <a:lnSpc>
+                <a:spcPct val="120000"/>
+              </a:lnSpc>
+              <a:buNone/>
+            </a:pPr>
+            <a:r>
+              <a:rPr lang="en-US" sz="2000" dirty="0"/>
+              <a:t>Categorical Data Analysis </a:t>
+            </a:r>
+          </a:p>
+          <a:p>
+            <a:pPr lvl="1">
+              <a:lnSpc>
+                <a:spcPct val="120000"/>
+              </a:lnSpc>
+            </a:pPr>
+            <a:r>
+              <a:rPr lang="en-US" sz="1800" dirty="0"/>
+              <a:t>Tabulation </a:t>
+            </a:r>
+          </a:p>
+          <a:p>
+            <a:pPr lvl="1">
+              <a:lnSpc>
+                <a:spcPct val="120000"/>
+              </a:lnSpc>
+            </a:pPr>
+            <a:r>
+              <a:rPr lang="en-US" sz="1800" dirty="0"/>
+              <a:t>T-test</a:t>
+            </a:r>
+          </a:p>
+          <a:p>
+            <a:pPr>
+              <a:lnSpc>
+                <a:spcPct val="120000"/>
+              </a:lnSpc>
+            </a:pPr>
+            <a:r>
+              <a:rPr lang="en-US" sz="2000" dirty="0"/>
+              <a:t>Small Area Estimation</a:t>
+            </a:r>
+          </a:p>
+          <a:p>
+            <a:pPr lvl="1">
+              <a:lnSpc>
+                <a:spcPct val="120000"/>
+              </a:lnSpc>
+            </a:pPr>
+            <a:r>
+              <a:rPr lang="en-US" sz="1800" dirty="0"/>
+              <a:t>Area-level models </a:t>
+            </a:r>
+          </a:p>
+          <a:p>
+            <a:pPr lvl="1">
+              <a:lnSpc>
+                <a:spcPct val="120000"/>
+              </a:lnSpc>
+            </a:pPr>
+            <a:r>
+              <a:rPr lang="en-US" sz="1800" dirty="0"/>
+              <a:t>Unit-level models</a:t>
+            </a:r>
+          </a:p>
+        </p:txBody>
+      </p:sp>
       <p:sp>
         <p:nvSpPr>
           <p:cNvPr id="4" name="Date Placeholder 3">
@@ -5148,61 +5529,10 @@
           </a:p>
         </p:txBody>
       </p:sp>
-      <p:sp>
-        <p:nvSpPr>
-          <p:cNvPr id="10" name="TextBox 9">
-            <a:extLst>
-              <a:ext uri="{FF2B5EF4-FFF2-40B4-BE49-F238E27FC236}">
-                <a16:creationId xmlns:a16="http://schemas.microsoft.com/office/drawing/2014/main" id="{AD69CD2D-1A2A-41B3-A13A-171D83401ACC}"/>
-              </a:ext>
-            </a:extLst>
-          </p:cNvPr>
-          <p:cNvSpPr txBox="1"/>
-          <p:nvPr/>
-        </p:nvSpPr>
-        <p:spPr>
-          <a:xfrm>
-            <a:off x="1935791" y="5744143"/>
-            <a:ext cx="7688580" cy="276999"/>
-          </a:xfrm>
-          <a:prstGeom prst="rect">
-            <a:avLst/>
-          </a:prstGeom>
-          <a:noFill/>
-        </p:spPr>
-        <p:txBody>
-          <a:bodyPr wrap="none" rtlCol="0">
-            <a:spAutoFit/>
-          </a:bodyPr>
-          <a:lstStyle/>
-          <a:p>
-            <a:r>
-              <a:rPr lang="en-US" sz="1200" dirty="0"/>
-              <a:t>Source: https://</a:t>
-            </a:r>
-            <a:r>
-              <a:rPr lang="en-US" sz="1200" dirty="0" err="1"/>
-              <a:t>medium.com</a:t>
-            </a:r>
-            <a:r>
-              <a:rPr lang="en-US" sz="1200" dirty="0"/>
-              <a:t>/@-</a:t>
-            </a:r>
-            <a:r>
-              <a:rPr lang="en-US" sz="1200" dirty="0" err="1"/>
-              <a:t>TutortAcademy</a:t>
-            </a:r>
-            <a:r>
-              <a:rPr lang="en-US" sz="1200" dirty="0"/>
-              <a:t>/why-python-is-so-essential-for-machine-learning-1a7701f5270d</a:t>
-            </a:r>
-          </a:p>
-        </p:txBody>
-      </p:sp>
     </p:spTree>
     <p:extLst>
       <p:ext uri="{BB962C8B-B14F-4D97-AF65-F5344CB8AC3E}">
-        <p14:creationId xmlns:p14="http://schemas.microsoft.com/office/powerpoint/2010/main" val="3488206172"/>
+        <p14:creationId xmlns:p14="http://schemas.microsoft.com/office/powerpoint/2010/main" val="1900575590"/>
       </p:ext>
     </p:extLst>
   </p:cSld>
@@ -5252,6 +5582,240 @@
           <a:p>
             <a:r>
               <a:rPr lang="en-US" dirty="0"/>
+              <a:t>Why develop a Python solution?</a:t>
+            </a:r>
+            <a:br>
+              <a:rPr lang="en-US" dirty="0"/>
+            </a:br>
+            <a:r>
+              <a:rPr lang="en-US" sz="3200" dirty="0">
+                <a:solidFill>
+                  <a:schemeClr val="accent4"/>
+                </a:solidFill>
+              </a:rPr>
+              <a:t>Python: one of the most used tool for data science/analysis</a:t>
+            </a:r>
+          </a:p>
+        </p:txBody>
+      </p:sp>
+      <p:pic>
+        <p:nvPicPr>
+          <p:cNvPr id="8" name="Content Placeholder 7" descr="Diagram&#10;&#10;Description automatically generated">
+            <a:extLst>
+              <a:ext uri="{FF2B5EF4-FFF2-40B4-BE49-F238E27FC236}">
+                <a16:creationId xmlns:a16="http://schemas.microsoft.com/office/drawing/2014/main" id="{2C66D708-3FE9-FD61-491E-258B3C7BD361}"/>
+              </a:ext>
+            </a:extLst>
+          </p:cNvPr>
+          <p:cNvPicPr>
+            <a:picLocks noGrp="1" noChangeAspect="1"/>
+          </p:cNvPicPr>
+          <p:nvPr>
+            <p:ph idx="1"/>
+          </p:nvPr>
+        </p:nvPicPr>
+        <p:blipFill>
+          <a:blip r:embed="rId2"/>
+          <a:stretch>
+            <a:fillRect/>
+          </a:stretch>
+        </p:blipFill>
+        <p:spPr>
+          <a:xfrm>
+            <a:off x="2489734" y="1818208"/>
+            <a:ext cx="6580694" cy="3798415"/>
+          </a:xfrm>
+        </p:spPr>
+      </p:pic>
+      <p:sp>
+        <p:nvSpPr>
+          <p:cNvPr id="4" name="Date Placeholder 3">
+            <a:extLst>
+              <a:ext uri="{FF2B5EF4-FFF2-40B4-BE49-F238E27FC236}">
+                <a16:creationId xmlns:a16="http://schemas.microsoft.com/office/drawing/2014/main" id="{FB2C5A03-4D2C-030B-9342-151C06739301}"/>
+              </a:ext>
+            </a:extLst>
+          </p:cNvPr>
+          <p:cNvSpPr>
+            <a:spLocks noGrp="1"/>
+          </p:cNvSpPr>
+          <p:nvPr>
+            <p:ph type="dt" sz="half" idx="10"/>
+          </p:nvPr>
+        </p:nvSpPr>
+        <p:spPr/>
+        <p:txBody>
+          <a:bodyPr/>
+          <a:lstStyle/>
+          <a:p>
+            <a:r>
+              <a:rPr lang="en-US"/>
+              <a:t>11 May 2022</a:t>
+            </a:r>
+          </a:p>
+        </p:txBody>
+      </p:sp>
+      <p:sp>
+        <p:nvSpPr>
+          <p:cNvPr id="5" name="Slide Number Placeholder 4">
+            <a:extLst>
+              <a:ext uri="{FF2B5EF4-FFF2-40B4-BE49-F238E27FC236}">
+                <a16:creationId xmlns:a16="http://schemas.microsoft.com/office/drawing/2014/main" id="{A3C7133C-D7A2-707F-3724-100F03474131}"/>
+              </a:ext>
+            </a:extLst>
+          </p:cNvPr>
+          <p:cNvSpPr>
+            <a:spLocks noGrp="1"/>
+          </p:cNvSpPr>
+          <p:nvPr>
+            <p:ph type="sldNum" sz="quarter" idx="12"/>
+          </p:nvPr>
+        </p:nvSpPr>
+        <p:spPr/>
+        <p:txBody>
+          <a:bodyPr/>
+          <a:lstStyle/>
+          <a:p>
+            <a:fld id="{BBEA9D41-9AF1-9B4E-9C34-CE71C23DCD02}" type="slidenum">
+              <a:rPr lang="en-US" smtClean="0"/>
+              <a:t>6</a:t>
+            </a:fld>
+            <a:endParaRPr lang="en-US"/>
+          </a:p>
+        </p:txBody>
+      </p:sp>
+      <p:sp>
+        <p:nvSpPr>
+          <p:cNvPr id="7" name="Footer Placeholder 6">
+            <a:extLst>
+              <a:ext uri="{FF2B5EF4-FFF2-40B4-BE49-F238E27FC236}">
+                <a16:creationId xmlns:a16="http://schemas.microsoft.com/office/drawing/2014/main" id="{CCDC45CE-8D34-3E3B-30CC-3F7A71ADC2E4}"/>
+              </a:ext>
+            </a:extLst>
+          </p:cNvPr>
+          <p:cNvSpPr>
+            <a:spLocks noGrp="1"/>
+          </p:cNvSpPr>
+          <p:nvPr>
+            <p:ph type="ftr" sz="quarter" idx="11"/>
+          </p:nvPr>
+        </p:nvSpPr>
+        <p:spPr/>
+        <p:txBody>
+          <a:bodyPr/>
+          <a:lstStyle/>
+          <a:p>
+            <a:r>
+              <a:rPr lang="en-US"/>
+              <a:t>https://github.com/samplics-org/aapor_short_course_may2022</a:t>
+            </a:r>
+          </a:p>
+        </p:txBody>
+      </p:sp>
+      <p:sp>
+        <p:nvSpPr>
+          <p:cNvPr id="10" name="TextBox 9">
+            <a:extLst>
+              <a:ext uri="{FF2B5EF4-FFF2-40B4-BE49-F238E27FC236}">
+                <a16:creationId xmlns:a16="http://schemas.microsoft.com/office/drawing/2014/main" id="{AD69CD2D-1A2A-41B3-A13A-171D83401ACC}"/>
+              </a:ext>
+            </a:extLst>
+          </p:cNvPr>
+          <p:cNvSpPr txBox="1"/>
+          <p:nvPr/>
+        </p:nvSpPr>
+        <p:spPr>
+          <a:xfrm>
+            <a:off x="1935791" y="5744143"/>
+            <a:ext cx="7688580" cy="276999"/>
+          </a:xfrm>
+          <a:prstGeom prst="rect">
+            <a:avLst/>
+          </a:prstGeom>
+          <a:noFill/>
+        </p:spPr>
+        <p:txBody>
+          <a:bodyPr wrap="none" rtlCol="0">
+            <a:spAutoFit/>
+          </a:bodyPr>
+          <a:lstStyle/>
+          <a:p>
+            <a:r>
+              <a:rPr lang="en-US" sz="1200" dirty="0"/>
+              <a:t>Source: https://</a:t>
+            </a:r>
+            <a:r>
+              <a:rPr lang="en-US" sz="1200" dirty="0" err="1"/>
+              <a:t>medium.com</a:t>
+            </a:r>
+            <a:r>
+              <a:rPr lang="en-US" sz="1200" dirty="0"/>
+              <a:t>/@-</a:t>
+            </a:r>
+            <a:r>
+              <a:rPr lang="en-US" sz="1200" dirty="0" err="1"/>
+              <a:t>TutortAcademy</a:t>
+            </a:r>
+            <a:r>
+              <a:rPr lang="en-US" sz="1200" dirty="0"/>
+              <a:t>/why-python-is-so-essential-for-machine-learning-1a7701f5270d</a:t>
+            </a:r>
+          </a:p>
+        </p:txBody>
+      </p:sp>
+    </p:spTree>
+    <p:extLst>
+      <p:ext uri="{BB962C8B-B14F-4D97-AF65-F5344CB8AC3E}">
+        <p14:creationId xmlns:p14="http://schemas.microsoft.com/office/powerpoint/2010/main" val="3488206172"/>
+      </p:ext>
+    </p:extLst>
+  </p:cSld>
+  <p:clrMapOvr>
+    <a:masterClrMapping/>
+  </p:clrMapOvr>
+</p:sld>
+</file>
+
+<file path=ppt/slides/slide7.xml><?xml version="1.0" encoding="utf-8"?>
+<p:sld xmlns:a="http://schemas.openxmlformats.org/drawingml/2006/main" xmlns:r="http://schemas.openxmlformats.org/officeDocument/2006/relationships" xmlns:p="http://schemas.openxmlformats.org/presentationml/2006/main">
+  <p:cSld>
+    <p:spTree>
+      <p:nvGrpSpPr>
+        <p:cNvPr id="1" name=""/>
+        <p:cNvGrpSpPr/>
+        <p:nvPr/>
+      </p:nvGrpSpPr>
+      <p:grpSpPr>
+        <a:xfrm>
+          <a:off x="0" y="0"/>
+          <a:ext cx="0" cy="0"/>
+          <a:chOff x="0" y="0"/>
+          <a:chExt cx="0" cy="0"/>
+        </a:xfrm>
+      </p:grpSpPr>
+      <p:sp>
+        <p:nvSpPr>
+          <p:cNvPr id="2" name="Title 1">
+            <a:extLst>
+              <a:ext uri="{FF2B5EF4-FFF2-40B4-BE49-F238E27FC236}">
+                <a16:creationId xmlns:a16="http://schemas.microsoft.com/office/drawing/2014/main" id="{CC35F8CD-F792-26AD-4D5B-B6010438C4AA}"/>
+              </a:ext>
+            </a:extLst>
+          </p:cNvPr>
+          <p:cNvSpPr>
+            <a:spLocks noGrp="1"/>
+          </p:cNvSpPr>
+          <p:nvPr>
+            <p:ph type="title"/>
+          </p:nvPr>
+        </p:nvSpPr>
+        <p:spPr/>
+        <p:txBody>
+          <a:bodyPr/>
+          <a:lstStyle/>
+          <a:p>
+            <a:r>
+              <a:rPr lang="en-US" dirty="0"/>
               <a:t>What is Python used for?</a:t>
             </a:r>
             <a:br>
@@ -5319,7 +5883,7 @@
           <a:p>
             <a:fld id="{BBEA9D41-9AF1-9B4E-9C34-CE71C23DCD02}" type="slidenum">
               <a:rPr lang="en-US" smtClean="0"/>
-              <a:t>6</a:t>
+              <a:t>7</a:t>
             </a:fld>
             <a:endParaRPr lang="en-US"/>
           </a:p>
@@ -5458,7 +6022,7 @@
 </p:sld>
 </file>
 
-<file path=ppt/slides/slide7.xml><?xml version="1.0" encoding="utf-8"?>
+<file path=ppt/slides/slide8.xml><?xml version="1.0" encoding="utf-8"?>
 <p:sld xmlns:a="http://schemas.openxmlformats.org/drawingml/2006/main" xmlns:r="http://schemas.openxmlformats.org/officeDocument/2006/relationships" xmlns:p="http://schemas.openxmlformats.org/presentationml/2006/main">
   <p:cSld>
     <p:spTree>
@@ -5553,8 +6117,9 @@
           </a:bodyPr>
           <a:lstStyle/>
           <a:p>
-            <a:pPr marL="0" indent="0">
-              <a:buNone/>
+            <a:pPr marL="457200" indent="-457200">
+              <a:buFont typeface="+mj-lt"/>
+              <a:buAutoNum type="arabicPeriod"/>
             </a:pPr>
             <a:r>
               <a:rPr lang="en-US" sz="2400" dirty="0"/>
@@ -5597,14 +6162,16 @@
             </a:r>
           </a:p>
           <a:p>
-            <a:pPr marL="0" indent="0">
-              <a:buNone/>
+            <a:pPr>
+              <a:buFont typeface="+mj-lt"/>
+              <a:buAutoNum type="arabicPeriod"/>
             </a:pPr>
             <a:endParaRPr lang="en-US" sz="800" dirty="0"/>
           </a:p>
           <a:p>
-            <a:pPr marL="0" indent="0">
-              <a:buNone/>
+            <a:pPr marL="457200" indent="-457200">
+              <a:buFont typeface="+mj-lt"/>
+              <a:buAutoNum type="arabicPeriod"/>
             </a:pPr>
             <a:r>
               <a:rPr lang="en-US" sz="2400" dirty="0"/>
@@ -5649,14 +6216,16 @@
             </a:r>
           </a:p>
           <a:p>
-            <a:pPr marL="0" indent="0">
-              <a:buNone/>
+            <a:pPr>
+              <a:buFont typeface="+mj-lt"/>
+              <a:buAutoNum type="arabicPeriod"/>
             </a:pPr>
             <a:endParaRPr lang="en-US" sz="800" dirty="0"/>
           </a:p>
           <a:p>
-            <a:pPr marL="0" indent="0">
-              <a:buNone/>
+            <a:pPr marL="514350" indent="-514350">
+              <a:buFont typeface="+mj-lt"/>
+              <a:buAutoNum type="arabicPeriod"/>
             </a:pPr>
             <a:r>
               <a:rPr lang="en-US" dirty="0" err="1"/>
@@ -5757,7 +6326,7 @@
           <a:p>
             <a:fld id="{BBEA9D41-9AF1-9B4E-9C34-CE71C23DCD02}" type="slidenum">
               <a:rPr lang="en-US" smtClean="0"/>
-              <a:t>7</a:t>
+              <a:t>8</a:t>
             </a:fld>
             <a:endParaRPr lang="en-US"/>
           </a:p>
@@ -5804,7 +6373,7 @@
 </p:sld>
 </file>
 
-<file path=ppt/slides/slide8.xml><?xml version="1.0" encoding="utf-8"?>
+<file path=ppt/slides/slide9.xml><?xml version="1.0" encoding="utf-8"?>
 <p:sld xmlns:a="http://schemas.openxmlformats.org/drawingml/2006/main" xmlns:r="http://schemas.openxmlformats.org/officeDocument/2006/relationships" xmlns:p="http://schemas.openxmlformats.org/presentationml/2006/main">
   <p:cSld>
     <p:spTree>

</xml_diff>